<commit_message>
changed the overall architecture
</commit_message>
<xml_diff>
--- a/Pitch.pptx
+++ b/Pitch.pptx
@@ -130,6 +130,75 @@
 </p:presentation>
 </file>
 
+<file path=ppt/revisionInfo.xml><?xml version="1.0" encoding="utf-8"?>
+<p1510:revInfo xmlns:a="http://schemas.openxmlformats.org/drawingml/2006/main" xmlns:r="http://schemas.openxmlformats.org/officeDocument/2006/relationships" xmlns:p1510="http://schemas.microsoft.com/office/powerpoint/2015/10/main">
+  <p1510:revLst>
+    <p1510:client id="{551EA9F2-9656-45E0-8531-BFE0E480C116}" v="2" dt="2025-07-15T02:46:53.232"/>
+  </p1510:revLst>
+</p1510:revInfo>
+</file>
+
+<file path=ppt/changesInfos/changesInfo1.xml><?xml version="1.0" encoding="utf-8"?>
+<pc:chgInfo xmlns:a="http://schemas.openxmlformats.org/drawingml/2006/main" xmlns:r="http://schemas.openxmlformats.org/officeDocument/2006/relationships" xmlns:ac="http://schemas.microsoft.com/office/drawing/2013/main/command" xmlns:pc="http://schemas.microsoft.com/office/powerpoint/2013/main/command">
+  <pc:docChgLst>
+    <pc:chgData name="Franco Doi" userId="e1b95856ff56e5ad" providerId="LiveId" clId="{551EA9F2-9656-45E0-8531-BFE0E480C116}"/>
+    <pc:docChg chg="custSel modSld">
+      <pc:chgData name="Franco Doi" userId="e1b95856ff56e5ad" providerId="LiveId" clId="{551EA9F2-9656-45E0-8531-BFE0E480C116}" dt="2025-07-15T02:47:08.183" v="14" actId="14100"/>
+      <pc:docMkLst>
+        <pc:docMk/>
+      </pc:docMkLst>
+      <pc:sldChg chg="addSp delSp modSp mod">
+        <pc:chgData name="Franco Doi" userId="e1b95856ff56e5ad" providerId="LiveId" clId="{551EA9F2-9656-45E0-8531-BFE0E480C116}" dt="2025-07-15T02:47:08.183" v="14" actId="14100"/>
+        <pc:sldMkLst>
+          <pc:docMk/>
+          <pc:sldMk cId="2724626382" sldId="259"/>
+        </pc:sldMkLst>
+        <pc:spChg chg="add del mod">
+          <ac:chgData name="Franco Doi" userId="e1b95856ff56e5ad" providerId="LiveId" clId="{551EA9F2-9656-45E0-8531-BFE0E480C116}" dt="2025-07-15T02:45:24.205" v="1"/>
+          <ac:spMkLst>
+            <pc:docMk/>
+            <pc:sldMk cId="2724626382" sldId="259"/>
+            <ac:spMk id="5" creationId="{E0F7867D-9A84-2345-178B-3DCE7BD6BB1B}"/>
+          </ac:spMkLst>
+        </pc:spChg>
+        <pc:spChg chg="add del mod">
+          <ac:chgData name="Franco Doi" userId="e1b95856ff56e5ad" providerId="LiveId" clId="{551EA9F2-9656-45E0-8531-BFE0E480C116}" dt="2025-07-15T02:46:53.232" v="8"/>
+          <ac:spMkLst>
+            <pc:docMk/>
+            <pc:sldMk cId="2724626382" sldId="259"/>
+            <ac:spMk id="10" creationId="{067B4C6A-37DC-6421-B564-51A2906A4D68}"/>
+          </ac:spMkLst>
+        </pc:spChg>
+        <pc:picChg chg="del">
+          <ac:chgData name="Franco Doi" userId="e1b95856ff56e5ad" providerId="LiveId" clId="{551EA9F2-9656-45E0-8531-BFE0E480C116}" dt="2025-07-15T02:45:23.776" v="0" actId="478"/>
+          <ac:picMkLst>
+            <pc:docMk/>
+            <pc:sldMk cId="2724626382" sldId="259"/>
+            <ac:picMk id="6" creationId="{57AF42A5-0757-564F-CAE3-3671C206F6CB}"/>
+          </ac:picMkLst>
+        </pc:picChg>
+        <pc:picChg chg="add del mod">
+          <ac:chgData name="Franco Doi" userId="e1b95856ff56e5ad" providerId="LiveId" clId="{551EA9F2-9656-45E0-8531-BFE0E480C116}" dt="2025-07-15T02:46:52.656" v="7" actId="478"/>
+          <ac:picMkLst>
+            <pc:docMk/>
+            <pc:sldMk cId="2724626382" sldId="259"/>
+            <ac:picMk id="8" creationId="{F2D3010D-BC8E-08C1-FE46-434BC729045F}"/>
+          </ac:picMkLst>
+        </pc:picChg>
+        <pc:picChg chg="add mod">
+          <ac:chgData name="Franco Doi" userId="e1b95856ff56e5ad" providerId="LiveId" clId="{551EA9F2-9656-45E0-8531-BFE0E480C116}" dt="2025-07-15T02:47:08.183" v="14" actId="14100"/>
+          <ac:picMkLst>
+            <pc:docMk/>
+            <pc:sldMk cId="2724626382" sldId="259"/>
+            <ac:picMk id="12" creationId="{AF6899E4-408D-45B8-637E-6ED9D77169EC}"/>
+          </ac:picMkLst>
+        </pc:picChg>
+      </pc:sldChg>
+    </pc:docChg>
+  </pc:docChgLst>
+</pc:chgInfo>
+</file>
+
 <file path=ppt/notesMasters/notesMaster1.xml><?xml version="1.0" encoding="utf-8"?>
 <p:notesMaster xmlns:a="http://schemas.openxmlformats.org/drawingml/2006/main" xmlns:r="http://schemas.openxmlformats.org/officeDocument/2006/relationships" xmlns:p="http://schemas.openxmlformats.org/presentationml/2006/main">
   <p:cSld>
@@ -212,7 +281,7 @@
           <a:p>
             <a:fld id="{4B2CACE1-0839-DD4E-8A8D-815B08AED9A4}" type="datetimeFigureOut">
               <a:rPr lang="en-US" smtClean="0"/>
-              <a:t>7/13/2025</a:t>
+              <a:t>7/14/2025</a:t>
             </a:fld>
             <a:endParaRPr lang="en-US"/>
           </a:p>
@@ -2951,35 +3020,6 @@
           </a:p>
         </p:txBody>
       </p:sp>
-      <p:pic>
-        <p:nvPicPr>
-          <p:cNvPr id="6" name="Content Placeholder 5">
-            <a:extLst>
-              <a:ext uri="{FF2B5EF4-FFF2-40B4-BE49-F238E27FC236}">
-                <a16:creationId xmlns:a16="http://schemas.microsoft.com/office/drawing/2014/main" id="{57AF42A5-0757-564F-CAE3-3671C206F6CB}"/>
-              </a:ext>
-            </a:extLst>
-          </p:cNvPr>
-          <p:cNvPicPr>
-            <a:picLocks noGrp="1" noChangeAspect="1"/>
-          </p:cNvPicPr>
-          <p:nvPr>
-            <p:ph idx="1"/>
-          </p:nvPr>
-        </p:nvPicPr>
-        <p:blipFill>
-          <a:blip r:embed="rId2"/>
-          <a:stretch>
-            <a:fillRect/>
-          </a:stretch>
-        </p:blipFill>
-        <p:spPr>
-          <a:xfrm>
-            <a:off x="1798820" y="1304143"/>
-            <a:ext cx="6790544" cy="4900275"/>
-          </a:xfrm>
-        </p:spPr>
-      </p:pic>
       <p:sp>
         <p:nvSpPr>
           <p:cNvPr id="4" name="Slide Number Placeholder 3">
@@ -3010,6 +3050,35 @@
           </a:p>
         </p:txBody>
       </p:sp>
+      <p:pic>
+        <p:nvPicPr>
+          <p:cNvPr id="12" name="Content Placeholder 11" descr="A diagram of a market&#10;&#10;AI-generated content may be incorrect.">
+            <a:extLst>
+              <a:ext uri="{FF2B5EF4-FFF2-40B4-BE49-F238E27FC236}">
+                <a16:creationId xmlns:a16="http://schemas.microsoft.com/office/drawing/2014/main" id="{AF6899E4-408D-45B8-637E-6ED9D77169EC}"/>
+              </a:ext>
+            </a:extLst>
+          </p:cNvPr>
+          <p:cNvPicPr>
+            <a:picLocks noGrp="1" noChangeAspect="1"/>
+          </p:cNvPicPr>
+          <p:nvPr>
+            <p:ph idx="1"/>
+          </p:nvPr>
+        </p:nvPicPr>
+        <p:blipFill>
+          <a:blip r:embed="rId2"/>
+          <a:stretch>
+            <a:fillRect/>
+          </a:stretch>
+        </p:blipFill>
+        <p:spPr>
+          <a:xfrm>
+            <a:off x="2563399" y="1497366"/>
+            <a:ext cx="6838834" cy="4778768"/>
+          </a:xfrm>
+        </p:spPr>
+      </p:pic>
     </p:spTree>
     <p:extLst>
       <p:ext uri="{BB962C8B-B14F-4D97-AF65-F5344CB8AC3E}">
@@ -3743,12 +3812,26 @@
 </file>
 
 <file path=customXml/item1.xml><?xml version="1.0" encoding="utf-8"?>
-<?mso-contentType ?>
-<FormTemplates xmlns="http://schemas.microsoft.com/sharepoint/v3/contenttype/forms">
-  <Display>DocumentLibraryForm</Display>
-  <Edit>DocumentLibraryForm</Edit>
-  <New>DocumentLibraryForm</New>
-</FormTemplates>
+<p:properties xmlns:p="http://schemas.microsoft.com/office/2006/metadata/properties" xmlns:xsi="http://www.w3.org/2001/XMLSchema-instance" xmlns:pc="http://schemas.microsoft.com/office/infopath/2007/PartnerControls">
+  <documentManagement>
+    <SharedWithUsers xmlns="7a4191d5-9b76-4ae3-8401-87ceee92a846">
+      <UserInfo>
+        <DisplayName>Office Of Advancement Visitors</DisplayName>
+        <AccountId>4</AccountId>
+        <AccountType/>
+      </UserInfo>
+      <UserInfo>
+        <DisplayName>UCalgary Brand</DisplayName>
+        <AccountId>15</AccountId>
+        <AccountType/>
+      </UserInfo>
+    </SharedWithUsers>
+    <TaxCatchAll xmlns="7a4191d5-9b76-4ae3-8401-87ceee92a846" xsi:nil="true"/>
+    <lcf76f155ced4ddcb4097134ff3c332f xmlns="b9b0194d-1e98-4efc-bad5-9450f4bf7a13">
+      <Terms xmlns="http://schemas.microsoft.com/office/infopath/2007/PartnerControls"/>
+    </lcf76f155ced4ddcb4097134ff3c332f>
+  </documentManagement>
+</p:properties>
 </file>
 
 <file path=customXml/item2.xml><?xml version="1.0" encoding="utf-8"?>
@@ -3975,32 +4058,21 @@
 </file>
 
 <file path=customXml/item3.xml><?xml version="1.0" encoding="utf-8"?>
-<p:properties xmlns:p="http://schemas.microsoft.com/office/2006/metadata/properties" xmlns:xsi="http://www.w3.org/2001/XMLSchema-instance" xmlns:pc="http://schemas.microsoft.com/office/infopath/2007/PartnerControls">
-  <documentManagement>
-    <SharedWithUsers xmlns="7a4191d5-9b76-4ae3-8401-87ceee92a846">
-      <UserInfo>
-        <DisplayName>Office Of Advancement Visitors</DisplayName>
-        <AccountId>4</AccountId>
-        <AccountType/>
-      </UserInfo>
-      <UserInfo>
-        <DisplayName>UCalgary Brand</DisplayName>
-        <AccountId>15</AccountId>
-        <AccountType/>
-      </UserInfo>
-    </SharedWithUsers>
-    <TaxCatchAll xmlns="7a4191d5-9b76-4ae3-8401-87ceee92a846" xsi:nil="true"/>
-    <lcf76f155ced4ddcb4097134ff3c332f xmlns="b9b0194d-1e98-4efc-bad5-9450f4bf7a13">
-      <Terms xmlns="http://schemas.microsoft.com/office/infopath/2007/PartnerControls"/>
-    </lcf76f155ced4ddcb4097134ff3c332f>
-  </documentManagement>
-</p:properties>
+<?mso-contentType ?>
+<FormTemplates xmlns="http://schemas.microsoft.com/sharepoint/v3/contenttype/forms">
+  <Display>DocumentLibraryForm</Display>
+  <Edit>DocumentLibraryForm</Edit>
+  <New>DocumentLibraryForm</New>
+</FormTemplates>
 </file>
 
 <file path=customXml/itemProps1.xml><?xml version="1.0" encoding="utf-8"?>
-<ds:datastoreItem xmlns:ds="http://schemas.openxmlformats.org/officeDocument/2006/customXml" ds:itemID="{B1379BBF-6672-4ABD-B16E-D222A38B6B94}">
+<ds:datastoreItem xmlns:ds="http://schemas.openxmlformats.org/officeDocument/2006/customXml" ds:itemID="{836ABDF2-BD05-4010-80BA-3DB41DBF8678}">
   <ds:schemaRefs>
-    <ds:schemaRef ds:uri="http://schemas.microsoft.com/sharepoint/v3/contenttype/forms"/>
+    <ds:schemaRef ds:uri="http://schemas.microsoft.com/office/2006/metadata/properties"/>
+    <ds:schemaRef ds:uri="http://schemas.microsoft.com/office/infopath/2007/PartnerControls"/>
+    <ds:schemaRef ds:uri="7a4191d5-9b76-4ae3-8401-87ceee92a846"/>
+    <ds:schemaRef ds:uri="b9b0194d-1e98-4efc-bad5-9450f4bf7a13"/>
   </ds:schemaRefs>
 </ds:datastoreItem>
 </file>
@@ -4025,12 +4097,9 @@
 </file>
 
 <file path=customXml/itemProps3.xml><?xml version="1.0" encoding="utf-8"?>
-<ds:datastoreItem xmlns:ds="http://schemas.openxmlformats.org/officeDocument/2006/customXml" ds:itemID="{836ABDF2-BD05-4010-80BA-3DB41DBF8678}">
+<ds:datastoreItem xmlns:ds="http://schemas.openxmlformats.org/officeDocument/2006/customXml" ds:itemID="{B1379BBF-6672-4ABD-B16E-D222A38B6B94}">
   <ds:schemaRefs>
-    <ds:schemaRef ds:uri="http://schemas.microsoft.com/office/2006/metadata/properties"/>
-    <ds:schemaRef ds:uri="http://schemas.microsoft.com/office/infopath/2007/PartnerControls"/>
-    <ds:schemaRef ds:uri="7a4191d5-9b76-4ae3-8401-87ceee92a846"/>
-    <ds:schemaRef ds:uri="b9b0194d-1e98-4efc-bad5-9450f4bf7a13"/>
+    <ds:schemaRef ds:uri="http://schemas.microsoft.com/sharepoint/v3/contenttype/forms"/>
   </ds:schemaRefs>
 </ds:datastoreItem>
 </file>
</xml_diff>